<commit_message>
doc: ekf diagram update
</commit_message>
<xml_diff>
--- a/docs/ekf-digram.pptx
+++ b/docs/ekf-digram.pptx
@@ -53,7 +53,7 @@
       </p:grpSpPr>
       <p:sp>
         <p:nvSpPr>
-          <p:cNvPr id="26" name="PlaceHolder 1"/>
+          <p:cNvPr id="21" name="PlaceHolder 1"/>
           <p:cNvSpPr>
             <a:spLocks noGrp="1"/>
           </p:cNvSpPr>
@@ -64,7 +64,7 @@
         <p:spPr>
           <a:xfrm>
             <a:off x="504000" y="301320"/>
-            <a:ext cx="9071640" cy="1262160"/>
+            <a:ext cx="9072000" cy="1261800"/>
           </a:xfrm>
           <a:prstGeom prst="rect">
             <a:avLst/>
@@ -90,7 +90,7 @@
       </p:sp>
       <p:sp>
         <p:nvSpPr>
-          <p:cNvPr id="27" name="PlaceHolder 2"/>
+          <p:cNvPr id="22" name="PlaceHolder 2"/>
           <p:cNvSpPr>
             <a:spLocks noGrp="1"/>
           </p:cNvSpPr>
@@ -100,8 +100,8 @@
         </p:nvSpPr>
         <p:spPr>
           <a:xfrm>
-            <a:off x="504000" y="1769040"/>
-            <a:ext cx="9071640" cy="2091240"/>
+            <a:off x="504000" y="1768680"/>
+            <a:ext cx="9072000" cy="2090880"/>
           </a:xfrm>
           <a:prstGeom prst="rect">
             <a:avLst/>
@@ -126,7 +126,7 @@
       </p:sp>
       <p:sp>
         <p:nvSpPr>
-          <p:cNvPr id="28" name="PlaceHolder 3"/>
+          <p:cNvPr id="23" name="PlaceHolder 3"/>
           <p:cNvSpPr>
             <a:spLocks noGrp="1"/>
           </p:cNvSpPr>
@@ -136,8 +136,8 @@
         </p:nvSpPr>
         <p:spPr>
           <a:xfrm>
-            <a:off x="504000" y="4059360"/>
-            <a:ext cx="9071640" cy="2091240"/>
+            <a:off x="504000" y="4058640"/>
+            <a:ext cx="9072000" cy="2090880"/>
           </a:xfrm>
           <a:prstGeom prst="rect">
             <a:avLst/>
@@ -184,7 +184,7 @@
       </p:grpSpPr>
       <p:sp>
         <p:nvSpPr>
-          <p:cNvPr id="29" name="PlaceHolder 1"/>
+          <p:cNvPr id="24" name="PlaceHolder 1"/>
           <p:cNvSpPr>
             <a:spLocks noGrp="1"/>
           </p:cNvSpPr>
@@ -195,7 +195,7 @@
         <p:spPr>
           <a:xfrm>
             <a:off x="504000" y="301320"/>
-            <a:ext cx="9071640" cy="1262160"/>
+            <a:ext cx="9072000" cy="1261800"/>
           </a:xfrm>
           <a:prstGeom prst="rect">
             <a:avLst/>
@@ -221,7 +221,7 @@
       </p:sp>
       <p:sp>
         <p:nvSpPr>
-          <p:cNvPr id="30" name="PlaceHolder 2"/>
+          <p:cNvPr id="25" name="PlaceHolder 2"/>
           <p:cNvSpPr>
             <a:spLocks noGrp="1"/>
           </p:cNvSpPr>
@@ -231,8 +231,8 @@
         </p:nvSpPr>
         <p:spPr>
           <a:xfrm>
-            <a:off x="504000" y="1769040"/>
-            <a:ext cx="4426920" cy="2091240"/>
+            <a:off x="504000" y="1768680"/>
+            <a:ext cx="4426920" cy="2090880"/>
           </a:xfrm>
           <a:prstGeom prst="rect">
             <a:avLst/>
@@ -257,7 +257,7 @@
       </p:sp>
       <p:sp>
         <p:nvSpPr>
-          <p:cNvPr id="31" name="PlaceHolder 3"/>
+          <p:cNvPr id="26" name="PlaceHolder 3"/>
           <p:cNvSpPr>
             <a:spLocks noGrp="1"/>
           </p:cNvSpPr>
@@ -267,8 +267,8 @@
         </p:nvSpPr>
         <p:spPr>
           <a:xfrm>
-            <a:off x="5152680" y="1769040"/>
-            <a:ext cx="4426920" cy="2091240"/>
+            <a:off x="5152680" y="1768680"/>
+            <a:ext cx="4426920" cy="2090880"/>
           </a:xfrm>
           <a:prstGeom prst="rect">
             <a:avLst/>
@@ -293,7 +293,7 @@
       </p:sp>
       <p:sp>
         <p:nvSpPr>
-          <p:cNvPr id="32" name="PlaceHolder 4"/>
+          <p:cNvPr id="27" name="PlaceHolder 4"/>
           <p:cNvSpPr>
             <a:spLocks noGrp="1"/>
           </p:cNvSpPr>
@@ -303,8 +303,8 @@
         </p:nvSpPr>
         <p:spPr>
           <a:xfrm>
-            <a:off x="5152680" y="4059360"/>
-            <a:ext cx="4426920" cy="2091240"/>
+            <a:off x="5152680" y="4058640"/>
+            <a:ext cx="4426920" cy="2090880"/>
           </a:xfrm>
           <a:prstGeom prst="rect">
             <a:avLst/>
@@ -329,7 +329,7 @@
       </p:sp>
       <p:sp>
         <p:nvSpPr>
-          <p:cNvPr id="33" name="PlaceHolder 5"/>
+          <p:cNvPr id="28" name="PlaceHolder 5"/>
           <p:cNvSpPr>
             <a:spLocks noGrp="1"/>
           </p:cNvSpPr>
@@ -339,8 +339,8 @@
         </p:nvSpPr>
         <p:spPr>
           <a:xfrm>
-            <a:off x="504000" y="4059360"/>
-            <a:ext cx="4426920" cy="2091240"/>
+            <a:off x="504000" y="4058640"/>
+            <a:ext cx="4426920" cy="2090880"/>
           </a:xfrm>
           <a:prstGeom prst="rect">
             <a:avLst/>
@@ -387,7 +387,7 @@
       </p:grpSpPr>
       <p:sp>
         <p:nvSpPr>
-          <p:cNvPr id="34" name="PlaceHolder 1"/>
+          <p:cNvPr id="29" name="PlaceHolder 1"/>
           <p:cNvSpPr>
             <a:spLocks noGrp="1"/>
           </p:cNvSpPr>
@@ -398,7 +398,7 @@
         <p:spPr>
           <a:xfrm>
             <a:off x="504000" y="301320"/>
-            <a:ext cx="9071640" cy="1262160"/>
+            <a:ext cx="9072000" cy="1261800"/>
           </a:xfrm>
           <a:prstGeom prst="rect">
             <a:avLst/>
@@ -424,7 +424,7 @@
       </p:sp>
       <p:sp>
         <p:nvSpPr>
-          <p:cNvPr id="35" name="PlaceHolder 2"/>
+          <p:cNvPr id="30" name="PlaceHolder 2"/>
           <p:cNvSpPr>
             <a:spLocks noGrp="1"/>
           </p:cNvSpPr>
@@ -434,8 +434,8 @@
         </p:nvSpPr>
         <p:spPr>
           <a:xfrm>
-            <a:off x="504000" y="1769040"/>
-            <a:ext cx="9071640" cy="4384440"/>
+            <a:off x="504000" y="1768680"/>
+            <a:ext cx="9072000" cy="4384080"/>
           </a:xfrm>
           <a:prstGeom prst="rect">
             <a:avLst/>
@@ -460,7 +460,7 @@
       </p:sp>
       <p:sp>
         <p:nvSpPr>
-          <p:cNvPr id="36" name="PlaceHolder 3"/>
+          <p:cNvPr id="31" name="PlaceHolder 3"/>
           <p:cNvSpPr>
             <a:spLocks noGrp="1"/>
           </p:cNvSpPr>
@@ -470,8 +470,8 @@
         </p:nvSpPr>
         <p:spPr>
           <a:xfrm>
-            <a:off x="504000" y="1769040"/>
-            <a:ext cx="9071640" cy="4384440"/>
+            <a:off x="504000" y="1768680"/>
+            <a:ext cx="9072000" cy="4384080"/>
           </a:xfrm>
           <a:prstGeom prst="rect">
             <a:avLst/>
@@ -496,7 +496,7 @@
       </p:sp>
       <p:pic>
         <p:nvPicPr>
-          <p:cNvPr id="37" name="" descr=""/>
+          <p:cNvPr id="32" name="" descr=""/>
           <p:cNvPicPr/>
           <p:nvPr/>
         </p:nvPicPr>
@@ -506,8 +506,8 @@
         </p:blipFill>
         <p:spPr>
           <a:xfrm>
-            <a:off x="2292120" y="1768680"/>
-            <a:ext cx="5495040" cy="4384440"/>
+            <a:off x="2292480" y="1768680"/>
+            <a:ext cx="5494680" cy="4384080"/>
           </a:xfrm>
           <a:prstGeom prst="rect">
             <a:avLst/>
@@ -519,7 +519,7 @@
       </p:pic>
       <p:pic>
         <p:nvPicPr>
-          <p:cNvPr id="38" name="" descr=""/>
+          <p:cNvPr id="33" name="" descr=""/>
           <p:cNvPicPr/>
           <p:nvPr/>
         </p:nvPicPr>
@@ -529,8 +529,8 @@
         </p:blipFill>
         <p:spPr>
           <a:xfrm>
-            <a:off x="2292120" y="1768680"/>
-            <a:ext cx="5495040" cy="4384440"/>
+            <a:off x="2292480" y="1768680"/>
+            <a:ext cx="5494680" cy="4384080"/>
           </a:xfrm>
           <a:prstGeom prst="rect">
             <a:avLst/>
@@ -564,7 +564,7 @@
       </p:grpSpPr>
       <p:sp>
         <p:nvSpPr>
-          <p:cNvPr id="5" name="PlaceHolder 1"/>
+          <p:cNvPr id="0" name="PlaceHolder 1"/>
           <p:cNvSpPr>
             <a:spLocks noGrp="1"/>
           </p:cNvSpPr>
@@ -575,7 +575,7 @@
         <p:spPr>
           <a:xfrm>
             <a:off x="504000" y="301320"/>
-            <a:ext cx="9071640" cy="1262160"/>
+            <a:ext cx="9072000" cy="1261800"/>
           </a:xfrm>
           <a:prstGeom prst="rect">
             <a:avLst/>
@@ -601,7 +601,7 @@
       </p:sp>
       <p:sp>
         <p:nvSpPr>
-          <p:cNvPr id="6" name="PlaceHolder 2"/>
+          <p:cNvPr id="1" name="PlaceHolder 2"/>
           <p:cNvSpPr>
             <a:spLocks noGrp="1"/>
           </p:cNvSpPr>
@@ -611,8 +611,8 @@
         </p:nvSpPr>
         <p:spPr>
           <a:xfrm>
-            <a:off x="504000" y="1769040"/>
-            <a:ext cx="9071640" cy="4384440"/>
+            <a:off x="504000" y="1768680"/>
+            <a:ext cx="9072000" cy="4384080"/>
           </a:xfrm>
           <a:prstGeom prst="rect">
             <a:avLst/>
@@ -660,7 +660,7 @@
       </p:grpSpPr>
       <p:sp>
         <p:nvSpPr>
-          <p:cNvPr id="7" name="PlaceHolder 1"/>
+          <p:cNvPr id="2" name="PlaceHolder 1"/>
           <p:cNvSpPr>
             <a:spLocks noGrp="1"/>
           </p:cNvSpPr>
@@ -671,7 +671,7 @@
         <p:spPr>
           <a:xfrm>
             <a:off x="504000" y="301320"/>
-            <a:ext cx="9071640" cy="1262160"/>
+            <a:ext cx="9072000" cy="1261800"/>
           </a:xfrm>
           <a:prstGeom prst="rect">
             <a:avLst/>
@@ -697,7 +697,7 @@
       </p:sp>
       <p:sp>
         <p:nvSpPr>
-          <p:cNvPr id="8" name="PlaceHolder 2"/>
+          <p:cNvPr id="3" name="PlaceHolder 2"/>
           <p:cNvSpPr>
             <a:spLocks noGrp="1"/>
           </p:cNvSpPr>
@@ -707,8 +707,8 @@
         </p:nvSpPr>
         <p:spPr>
           <a:xfrm>
-            <a:off x="504000" y="1769040"/>
-            <a:ext cx="9071640" cy="4384440"/>
+            <a:off x="504000" y="1768680"/>
+            <a:ext cx="9072000" cy="4384080"/>
           </a:xfrm>
           <a:prstGeom prst="rect">
             <a:avLst/>
@@ -755,7 +755,7 @@
       </p:grpSpPr>
       <p:sp>
         <p:nvSpPr>
-          <p:cNvPr id="9" name="PlaceHolder 1"/>
+          <p:cNvPr id="4" name="PlaceHolder 1"/>
           <p:cNvSpPr>
             <a:spLocks noGrp="1"/>
           </p:cNvSpPr>
@@ -766,7 +766,7 @@
         <p:spPr>
           <a:xfrm>
             <a:off x="504000" y="301320"/>
-            <a:ext cx="9071640" cy="1262160"/>
+            <a:ext cx="9072000" cy="1261800"/>
           </a:xfrm>
           <a:prstGeom prst="rect">
             <a:avLst/>
@@ -792,7 +792,7 @@
       </p:sp>
       <p:sp>
         <p:nvSpPr>
-          <p:cNvPr id="10" name="PlaceHolder 2"/>
+          <p:cNvPr id="5" name="PlaceHolder 2"/>
           <p:cNvSpPr>
             <a:spLocks noGrp="1"/>
           </p:cNvSpPr>
@@ -802,8 +802,8 @@
         </p:nvSpPr>
         <p:spPr>
           <a:xfrm>
-            <a:off x="504000" y="1769040"/>
-            <a:ext cx="4426920" cy="4384440"/>
+            <a:off x="504000" y="1768680"/>
+            <a:ext cx="4426920" cy="4384080"/>
           </a:xfrm>
           <a:prstGeom prst="rect">
             <a:avLst/>
@@ -828,7 +828,7 @@
       </p:sp>
       <p:sp>
         <p:nvSpPr>
-          <p:cNvPr id="11" name="PlaceHolder 3"/>
+          <p:cNvPr id="6" name="PlaceHolder 3"/>
           <p:cNvSpPr>
             <a:spLocks noGrp="1"/>
           </p:cNvSpPr>
@@ -838,8 +838,8 @@
         </p:nvSpPr>
         <p:spPr>
           <a:xfrm>
-            <a:off x="5152680" y="1769040"/>
-            <a:ext cx="4426920" cy="4384440"/>
+            <a:off x="5152680" y="1768680"/>
+            <a:ext cx="4426920" cy="4384080"/>
           </a:xfrm>
           <a:prstGeom prst="rect">
             <a:avLst/>
@@ -886,7 +886,7 @@
       </p:grpSpPr>
       <p:sp>
         <p:nvSpPr>
-          <p:cNvPr id="12" name="PlaceHolder 1"/>
+          <p:cNvPr id="7" name="PlaceHolder 1"/>
           <p:cNvSpPr>
             <a:spLocks noGrp="1"/>
           </p:cNvSpPr>
@@ -897,7 +897,7 @@
         <p:spPr>
           <a:xfrm>
             <a:off x="504000" y="301320"/>
-            <a:ext cx="9071640" cy="1262160"/>
+            <a:ext cx="9072000" cy="1261800"/>
           </a:xfrm>
           <a:prstGeom prst="rect">
             <a:avLst/>
@@ -945,7 +945,7 @@
       </p:grpSpPr>
       <p:sp>
         <p:nvSpPr>
-          <p:cNvPr id="13" name="PlaceHolder 1"/>
+          <p:cNvPr id="8" name="PlaceHolder 1"/>
           <p:cNvSpPr>
             <a:spLocks noGrp="1"/>
           </p:cNvSpPr>
@@ -956,7 +956,7 @@
         <p:spPr>
           <a:xfrm>
             <a:off x="504000" y="301320"/>
-            <a:ext cx="9071640" cy="5851800"/>
+            <a:ext cx="9072000" cy="5850360"/>
           </a:xfrm>
           <a:prstGeom prst="rect">
             <a:avLst/>
@@ -1004,7 +1004,7 @@
       </p:grpSpPr>
       <p:sp>
         <p:nvSpPr>
-          <p:cNvPr id="14" name="PlaceHolder 1"/>
+          <p:cNvPr id="9" name="PlaceHolder 1"/>
           <p:cNvSpPr>
             <a:spLocks noGrp="1"/>
           </p:cNvSpPr>
@@ -1015,7 +1015,7 @@
         <p:spPr>
           <a:xfrm>
             <a:off x="504000" y="301320"/>
-            <a:ext cx="9071640" cy="1262160"/>
+            <a:ext cx="9072000" cy="1261800"/>
           </a:xfrm>
           <a:prstGeom prst="rect">
             <a:avLst/>
@@ -1041,7 +1041,7 @@
       </p:sp>
       <p:sp>
         <p:nvSpPr>
-          <p:cNvPr id="15" name="PlaceHolder 2"/>
+          <p:cNvPr id="10" name="PlaceHolder 2"/>
           <p:cNvSpPr>
             <a:spLocks noGrp="1"/>
           </p:cNvSpPr>
@@ -1051,8 +1051,8 @@
         </p:nvSpPr>
         <p:spPr>
           <a:xfrm>
-            <a:off x="504000" y="1769040"/>
-            <a:ext cx="4426920" cy="2091240"/>
+            <a:off x="504000" y="1768680"/>
+            <a:ext cx="4426920" cy="2090880"/>
           </a:xfrm>
           <a:prstGeom prst="rect">
             <a:avLst/>
@@ -1077,7 +1077,7 @@
       </p:sp>
       <p:sp>
         <p:nvSpPr>
-          <p:cNvPr id="16" name="PlaceHolder 3"/>
+          <p:cNvPr id="11" name="PlaceHolder 3"/>
           <p:cNvSpPr>
             <a:spLocks noGrp="1"/>
           </p:cNvSpPr>
@@ -1087,8 +1087,8 @@
         </p:nvSpPr>
         <p:spPr>
           <a:xfrm>
-            <a:off x="504000" y="4059360"/>
-            <a:ext cx="4426920" cy="2091240"/>
+            <a:off x="504000" y="4058640"/>
+            <a:ext cx="4426920" cy="2090880"/>
           </a:xfrm>
           <a:prstGeom prst="rect">
             <a:avLst/>
@@ -1113,7 +1113,7 @@
       </p:sp>
       <p:sp>
         <p:nvSpPr>
-          <p:cNvPr id="17" name="PlaceHolder 4"/>
+          <p:cNvPr id="12" name="PlaceHolder 4"/>
           <p:cNvSpPr>
             <a:spLocks noGrp="1"/>
           </p:cNvSpPr>
@@ -1123,8 +1123,8 @@
         </p:nvSpPr>
         <p:spPr>
           <a:xfrm>
-            <a:off x="5152680" y="1769040"/>
-            <a:ext cx="4426920" cy="4384440"/>
+            <a:off x="5152680" y="1768680"/>
+            <a:ext cx="4426920" cy="4384080"/>
           </a:xfrm>
           <a:prstGeom prst="rect">
             <a:avLst/>
@@ -1171,7 +1171,7 @@
       </p:grpSpPr>
       <p:sp>
         <p:nvSpPr>
-          <p:cNvPr id="18" name="PlaceHolder 1"/>
+          <p:cNvPr id="13" name="PlaceHolder 1"/>
           <p:cNvSpPr>
             <a:spLocks noGrp="1"/>
           </p:cNvSpPr>
@@ -1182,7 +1182,7 @@
         <p:spPr>
           <a:xfrm>
             <a:off x="504000" y="301320"/>
-            <a:ext cx="9071640" cy="1262160"/>
+            <a:ext cx="9072000" cy="1261800"/>
           </a:xfrm>
           <a:prstGeom prst="rect">
             <a:avLst/>
@@ -1208,7 +1208,7 @@
       </p:sp>
       <p:sp>
         <p:nvSpPr>
-          <p:cNvPr id="19" name="PlaceHolder 2"/>
+          <p:cNvPr id="14" name="PlaceHolder 2"/>
           <p:cNvSpPr>
             <a:spLocks noGrp="1"/>
           </p:cNvSpPr>
@@ -1218,8 +1218,8 @@
         </p:nvSpPr>
         <p:spPr>
           <a:xfrm>
-            <a:off x="504000" y="1769040"/>
-            <a:ext cx="4426920" cy="4384440"/>
+            <a:off x="504000" y="1768680"/>
+            <a:ext cx="4426920" cy="4384080"/>
           </a:xfrm>
           <a:prstGeom prst="rect">
             <a:avLst/>
@@ -1244,7 +1244,7 @@
       </p:sp>
       <p:sp>
         <p:nvSpPr>
-          <p:cNvPr id="20" name="PlaceHolder 3"/>
+          <p:cNvPr id="15" name="PlaceHolder 3"/>
           <p:cNvSpPr>
             <a:spLocks noGrp="1"/>
           </p:cNvSpPr>
@@ -1254,8 +1254,8 @@
         </p:nvSpPr>
         <p:spPr>
           <a:xfrm>
-            <a:off x="5152680" y="1769040"/>
-            <a:ext cx="4426920" cy="2091240"/>
+            <a:off x="5152680" y="1768680"/>
+            <a:ext cx="4426920" cy="2090880"/>
           </a:xfrm>
           <a:prstGeom prst="rect">
             <a:avLst/>
@@ -1280,7 +1280,7 @@
       </p:sp>
       <p:sp>
         <p:nvSpPr>
-          <p:cNvPr id="21" name="PlaceHolder 4"/>
+          <p:cNvPr id="16" name="PlaceHolder 4"/>
           <p:cNvSpPr>
             <a:spLocks noGrp="1"/>
           </p:cNvSpPr>
@@ -1290,8 +1290,8 @@
         </p:nvSpPr>
         <p:spPr>
           <a:xfrm>
-            <a:off x="5152680" y="4059360"/>
-            <a:ext cx="4426920" cy="2091240"/>
+            <a:off x="5152680" y="4058640"/>
+            <a:ext cx="4426920" cy="2090880"/>
           </a:xfrm>
           <a:prstGeom prst="rect">
             <a:avLst/>
@@ -1338,7 +1338,7 @@
       </p:grpSpPr>
       <p:sp>
         <p:nvSpPr>
-          <p:cNvPr id="22" name="PlaceHolder 1"/>
+          <p:cNvPr id="17" name="PlaceHolder 1"/>
           <p:cNvSpPr>
             <a:spLocks noGrp="1"/>
           </p:cNvSpPr>
@@ -1349,7 +1349,7 @@
         <p:spPr>
           <a:xfrm>
             <a:off x="504000" y="301320"/>
-            <a:ext cx="9071640" cy="1262160"/>
+            <a:ext cx="9072000" cy="1261800"/>
           </a:xfrm>
           <a:prstGeom prst="rect">
             <a:avLst/>
@@ -1375,7 +1375,7 @@
       </p:sp>
       <p:sp>
         <p:nvSpPr>
-          <p:cNvPr id="23" name="PlaceHolder 2"/>
+          <p:cNvPr id="18" name="PlaceHolder 2"/>
           <p:cNvSpPr>
             <a:spLocks noGrp="1"/>
           </p:cNvSpPr>
@@ -1385,8 +1385,8 @@
         </p:nvSpPr>
         <p:spPr>
           <a:xfrm>
-            <a:off x="504000" y="1769040"/>
-            <a:ext cx="4426920" cy="2091240"/>
+            <a:off x="504000" y="1768680"/>
+            <a:ext cx="4426920" cy="2090880"/>
           </a:xfrm>
           <a:prstGeom prst="rect">
             <a:avLst/>
@@ -1411,7 +1411,7 @@
       </p:sp>
       <p:sp>
         <p:nvSpPr>
-          <p:cNvPr id="24" name="PlaceHolder 3"/>
+          <p:cNvPr id="19" name="PlaceHolder 3"/>
           <p:cNvSpPr>
             <a:spLocks noGrp="1"/>
           </p:cNvSpPr>
@@ -1421,8 +1421,8 @@
         </p:nvSpPr>
         <p:spPr>
           <a:xfrm>
-            <a:off x="5152680" y="1769040"/>
-            <a:ext cx="4426920" cy="2091240"/>
+            <a:off x="5152680" y="1768680"/>
+            <a:ext cx="4426920" cy="2090880"/>
           </a:xfrm>
           <a:prstGeom prst="rect">
             <a:avLst/>
@@ -1447,7 +1447,7 @@
       </p:sp>
       <p:sp>
         <p:nvSpPr>
-          <p:cNvPr id="25" name="PlaceHolder 4"/>
+          <p:cNvPr id="20" name="PlaceHolder 4"/>
           <p:cNvSpPr>
             <a:spLocks noGrp="1"/>
           </p:cNvSpPr>
@@ -1457,8 +1457,8 @@
         </p:nvSpPr>
         <p:spPr>
           <a:xfrm>
-            <a:off x="504000" y="4059360"/>
-            <a:ext cx="9071640" cy="2091240"/>
+            <a:off x="504000" y="4058640"/>
+            <a:ext cx="9072000" cy="2090880"/>
           </a:xfrm>
           <a:prstGeom prst="rect">
             <a:avLst/>
@@ -1503,519 +1503,6 @@
           <a:chExt cx="0" cy="0"/>
         </a:xfrm>
       </p:grpSpPr>
-      <p:sp>
-        <p:nvSpPr>
-          <p:cNvPr id="0" name="PlaceHolder 1"/>
-          <p:cNvSpPr>
-            <a:spLocks noGrp="1"/>
-          </p:cNvSpPr>
-          <p:nvPr>
-            <p:ph type="title"/>
-          </p:nvPr>
-        </p:nvSpPr>
-        <p:spPr>
-          <a:xfrm>
-            <a:off x="504000" y="301320"/>
-            <a:ext cx="9071640" cy="1262160"/>
-          </a:xfrm>
-          <a:prstGeom prst="rect">
-            <a:avLst/>
-          </a:prstGeom>
-        </p:spPr>
-        <p:txBody>
-          <a:bodyPr lIns="0" rIns="0" tIns="0" bIns="0" anchor="ctr"/>
-          <a:p>
-            <a:pPr algn="ctr"/>
-            <a:r>
-              <a:rPr b="0" lang="en-US" sz="4400" spc="-1" strike="noStrike">
-                <a:solidFill>
-                  <a:srgbClr val="000000"/>
-                </a:solidFill>
-                <a:uFill>
-                  <a:solidFill>
-                    <a:srgbClr val="ffffff"/>
-                  </a:solidFill>
-                </a:uFill>
-                <a:latin typeface="Arial"/>
-              </a:rPr>
-              <a:t>Click to </a:t>
-            </a:r>
-            <a:r>
-              <a:rPr b="0" lang="en-US" sz="4400" spc="-1" strike="noStrike">
-                <a:solidFill>
-                  <a:srgbClr val="000000"/>
-                </a:solidFill>
-                <a:uFill>
-                  <a:solidFill>
-                    <a:srgbClr val="ffffff"/>
-                  </a:solidFill>
-                </a:uFill>
-                <a:latin typeface="Arial"/>
-              </a:rPr>
-              <a:t>edit the </a:t>
-            </a:r>
-            <a:r>
-              <a:rPr b="0" lang="en-US" sz="4400" spc="-1" strike="noStrike">
-                <a:solidFill>
-                  <a:srgbClr val="000000"/>
-                </a:solidFill>
-                <a:uFill>
-                  <a:solidFill>
-                    <a:srgbClr val="ffffff"/>
-                  </a:solidFill>
-                </a:uFill>
-                <a:latin typeface="Arial"/>
-              </a:rPr>
-              <a:t>title text </a:t>
-            </a:r>
-            <a:r>
-              <a:rPr b="0" lang="en-US" sz="4400" spc="-1" strike="noStrike">
-                <a:solidFill>
-                  <a:srgbClr val="000000"/>
-                </a:solidFill>
-                <a:uFill>
-                  <a:solidFill>
-                    <a:srgbClr val="ffffff"/>
-                  </a:solidFill>
-                </a:uFill>
-                <a:latin typeface="Arial"/>
-              </a:rPr>
-              <a:t>format</a:t>
-            </a:r>
-            <a:endParaRPr b="0" lang="en-US" sz="4400" spc="-1" strike="noStrike">
-              <a:solidFill>
-                <a:srgbClr val="000000"/>
-              </a:solidFill>
-              <a:uFill>
-                <a:solidFill>
-                  <a:srgbClr val="ffffff"/>
-                </a:solidFill>
-              </a:uFill>
-              <a:latin typeface="Arial"/>
-            </a:endParaRPr>
-          </a:p>
-        </p:txBody>
-      </p:sp>
-      <p:sp>
-        <p:nvSpPr>
-          <p:cNvPr id="1" name="PlaceHolder 2"/>
-          <p:cNvSpPr>
-            <a:spLocks noGrp="1"/>
-          </p:cNvSpPr>
-          <p:nvPr>
-            <p:ph type="body"/>
-          </p:nvPr>
-        </p:nvSpPr>
-        <p:spPr>
-          <a:xfrm>
-            <a:off x="504000" y="1769040"/>
-            <a:ext cx="9071640" cy="4384440"/>
-          </a:xfrm>
-          <a:prstGeom prst="rect">
-            <a:avLst/>
-          </a:prstGeom>
-        </p:spPr>
-        <p:txBody>
-          <a:bodyPr lIns="0" rIns="0" tIns="0" bIns="0"/>
-          <a:p>
-            <a:pPr marL="432000" indent="-324000">
-              <a:buClr>
-                <a:srgbClr val="000000"/>
-              </a:buClr>
-              <a:buSzPct val="45000"/>
-              <a:buFont typeface="Wingdings" charset="2"/>
-              <a:buChar char=""/>
-            </a:pPr>
-            <a:r>
-              <a:rPr b="0" lang="en-US" sz="3200" spc="-1" strike="noStrike">
-                <a:solidFill>
-                  <a:srgbClr val="000000"/>
-                </a:solidFill>
-                <a:uFill>
-                  <a:solidFill>
-                    <a:srgbClr val="ffffff"/>
-                  </a:solidFill>
-                </a:uFill>
-                <a:latin typeface="Arial"/>
-              </a:rPr>
-              <a:t>Click to edit the outline text format</a:t>
-            </a:r>
-            <a:endParaRPr b="0" lang="en-US" sz="3200" spc="-1" strike="noStrike">
-              <a:solidFill>
-                <a:srgbClr val="000000"/>
-              </a:solidFill>
-              <a:uFill>
-                <a:solidFill>
-                  <a:srgbClr val="ffffff"/>
-                </a:solidFill>
-              </a:uFill>
-              <a:latin typeface="Arial"/>
-            </a:endParaRPr>
-          </a:p>
-          <a:p>
-            <a:pPr lvl="1" marL="864000" indent="-324000">
-              <a:buClr>
-                <a:srgbClr val="000000"/>
-              </a:buClr>
-              <a:buSzPct val="75000"/>
-              <a:buFont typeface="Symbol" charset="2"/>
-              <a:buChar char=""/>
-            </a:pPr>
-            <a:r>
-              <a:rPr b="0" lang="en-US" sz="2800" spc="-1" strike="noStrike">
-                <a:solidFill>
-                  <a:srgbClr val="000000"/>
-                </a:solidFill>
-                <a:uFill>
-                  <a:solidFill>
-                    <a:srgbClr val="ffffff"/>
-                  </a:solidFill>
-                </a:uFill>
-                <a:latin typeface="Arial"/>
-              </a:rPr>
-              <a:t>Second Outline Level</a:t>
-            </a:r>
-            <a:endParaRPr b="0" lang="en-US" sz="2800" spc="-1" strike="noStrike">
-              <a:solidFill>
-                <a:srgbClr val="000000"/>
-              </a:solidFill>
-              <a:uFill>
-                <a:solidFill>
-                  <a:srgbClr val="ffffff"/>
-                </a:solidFill>
-              </a:uFill>
-              <a:latin typeface="Arial"/>
-            </a:endParaRPr>
-          </a:p>
-          <a:p>
-            <a:pPr lvl="2" marL="1296000" indent="-288000">
-              <a:buClr>
-                <a:srgbClr val="000000"/>
-              </a:buClr>
-              <a:buSzPct val="45000"/>
-              <a:buFont typeface="Wingdings" charset="2"/>
-              <a:buChar char=""/>
-            </a:pPr>
-            <a:r>
-              <a:rPr b="0" lang="en-US" sz="2400" spc="-1" strike="noStrike">
-                <a:solidFill>
-                  <a:srgbClr val="000000"/>
-                </a:solidFill>
-                <a:uFill>
-                  <a:solidFill>
-                    <a:srgbClr val="ffffff"/>
-                  </a:solidFill>
-                </a:uFill>
-                <a:latin typeface="Arial"/>
-              </a:rPr>
-              <a:t>Third Outline Level</a:t>
-            </a:r>
-            <a:endParaRPr b="0" lang="en-US" sz="2400" spc="-1" strike="noStrike">
-              <a:solidFill>
-                <a:srgbClr val="000000"/>
-              </a:solidFill>
-              <a:uFill>
-                <a:solidFill>
-                  <a:srgbClr val="ffffff"/>
-                </a:solidFill>
-              </a:uFill>
-              <a:latin typeface="Arial"/>
-            </a:endParaRPr>
-          </a:p>
-          <a:p>
-            <a:pPr lvl="3" marL="1728000" indent="-216000">
-              <a:buClr>
-                <a:srgbClr val="000000"/>
-              </a:buClr>
-              <a:buSzPct val="75000"/>
-              <a:buFont typeface="Symbol" charset="2"/>
-              <a:buChar char=""/>
-            </a:pPr>
-            <a:r>
-              <a:rPr b="0" lang="en-US" sz="2000" spc="-1" strike="noStrike">
-                <a:solidFill>
-                  <a:srgbClr val="000000"/>
-                </a:solidFill>
-                <a:uFill>
-                  <a:solidFill>
-                    <a:srgbClr val="ffffff"/>
-                  </a:solidFill>
-                </a:uFill>
-                <a:latin typeface="Arial"/>
-              </a:rPr>
-              <a:t>Fourth Outline Level</a:t>
-            </a:r>
-            <a:endParaRPr b="0" lang="en-US" sz="2000" spc="-1" strike="noStrike">
-              <a:solidFill>
-                <a:srgbClr val="000000"/>
-              </a:solidFill>
-              <a:uFill>
-                <a:solidFill>
-                  <a:srgbClr val="ffffff"/>
-                </a:solidFill>
-              </a:uFill>
-              <a:latin typeface="Arial"/>
-            </a:endParaRPr>
-          </a:p>
-          <a:p>
-            <a:pPr lvl="4" marL="2160000" indent="-216000">
-              <a:buClr>
-                <a:srgbClr val="000000"/>
-              </a:buClr>
-              <a:buSzPct val="45000"/>
-              <a:buFont typeface="Wingdings" charset="2"/>
-              <a:buChar char=""/>
-            </a:pPr>
-            <a:r>
-              <a:rPr b="0" lang="en-US" sz="2000" spc="-1" strike="noStrike">
-                <a:solidFill>
-                  <a:srgbClr val="000000"/>
-                </a:solidFill>
-                <a:uFill>
-                  <a:solidFill>
-                    <a:srgbClr val="ffffff"/>
-                  </a:solidFill>
-                </a:uFill>
-                <a:latin typeface="Arial"/>
-              </a:rPr>
-              <a:t>Fifth Outline Level</a:t>
-            </a:r>
-            <a:endParaRPr b="0" lang="en-US" sz="2000" spc="-1" strike="noStrike">
-              <a:solidFill>
-                <a:srgbClr val="000000"/>
-              </a:solidFill>
-              <a:uFill>
-                <a:solidFill>
-                  <a:srgbClr val="ffffff"/>
-                </a:solidFill>
-              </a:uFill>
-              <a:latin typeface="Arial"/>
-            </a:endParaRPr>
-          </a:p>
-          <a:p>
-            <a:pPr lvl="5" marL="2592000" indent="-216000">
-              <a:buClr>
-                <a:srgbClr val="000000"/>
-              </a:buClr>
-              <a:buSzPct val="45000"/>
-              <a:buFont typeface="Wingdings" charset="2"/>
-              <a:buChar char=""/>
-            </a:pPr>
-            <a:r>
-              <a:rPr b="0" lang="en-US" sz="2000" spc="-1" strike="noStrike">
-                <a:solidFill>
-                  <a:srgbClr val="000000"/>
-                </a:solidFill>
-                <a:uFill>
-                  <a:solidFill>
-                    <a:srgbClr val="ffffff"/>
-                  </a:solidFill>
-                </a:uFill>
-                <a:latin typeface="Arial"/>
-              </a:rPr>
-              <a:t>Sixth Outline Level</a:t>
-            </a:r>
-            <a:endParaRPr b="0" lang="en-US" sz="2000" spc="-1" strike="noStrike">
-              <a:solidFill>
-                <a:srgbClr val="000000"/>
-              </a:solidFill>
-              <a:uFill>
-                <a:solidFill>
-                  <a:srgbClr val="ffffff"/>
-                </a:solidFill>
-              </a:uFill>
-              <a:latin typeface="Arial"/>
-            </a:endParaRPr>
-          </a:p>
-          <a:p>
-            <a:pPr lvl="6" marL="3024000" indent="-216000">
-              <a:buClr>
-                <a:srgbClr val="000000"/>
-              </a:buClr>
-              <a:buSzPct val="45000"/>
-              <a:buFont typeface="Wingdings" charset="2"/>
-              <a:buChar char=""/>
-            </a:pPr>
-            <a:r>
-              <a:rPr b="0" lang="en-US" sz="2000" spc="-1" strike="noStrike">
-                <a:solidFill>
-                  <a:srgbClr val="000000"/>
-                </a:solidFill>
-                <a:uFill>
-                  <a:solidFill>
-                    <a:srgbClr val="ffffff"/>
-                  </a:solidFill>
-                </a:uFill>
-                <a:latin typeface="Arial"/>
-              </a:rPr>
-              <a:t>Seventh Outline Level</a:t>
-            </a:r>
-            <a:endParaRPr b="0" lang="en-US" sz="2000" spc="-1" strike="noStrike">
-              <a:solidFill>
-                <a:srgbClr val="000000"/>
-              </a:solidFill>
-              <a:uFill>
-                <a:solidFill>
-                  <a:srgbClr val="ffffff"/>
-                </a:solidFill>
-              </a:uFill>
-              <a:latin typeface="Arial"/>
-            </a:endParaRPr>
-          </a:p>
-        </p:txBody>
-      </p:sp>
-      <p:sp>
-        <p:nvSpPr>
-          <p:cNvPr id="2" name="PlaceHolder 3"/>
-          <p:cNvSpPr>
-            <a:spLocks noGrp="1"/>
-          </p:cNvSpPr>
-          <p:nvPr>
-            <p:ph type="dt"/>
-          </p:nvPr>
-        </p:nvSpPr>
-        <p:spPr>
-          <a:xfrm>
-            <a:off x="504000" y="6887160"/>
-            <a:ext cx="2348280" cy="521280"/>
-          </a:xfrm>
-          <a:prstGeom prst="rect">
-            <a:avLst/>
-          </a:prstGeom>
-        </p:spPr>
-        <p:txBody>
-          <a:bodyPr lIns="0" rIns="0" tIns="0" bIns="0"/>
-          <a:p>
-            <a:r>
-              <a:rPr b="0" lang="en-US" sz="1400" spc="-1" strike="noStrike">
-                <a:solidFill>
-                  <a:srgbClr val="000000"/>
-                </a:solidFill>
-                <a:uFill>
-                  <a:solidFill>
-                    <a:srgbClr val="ffffff"/>
-                  </a:solidFill>
-                </a:uFill>
-                <a:latin typeface="Times New Roman"/>
-              </a:rPr>
-              <a:t>&lt;date/time&gt;</a:t>
-            </a:r>
-            <a:endParaRPr b="0" lang="en-US" sz="1400" spc="-1" strike="noStrike">
-              <a:solidFill>
-                <a:srgbClr val="000000"/>
-              </a:solidFill>
-              <a:uFill>
-                <a:solidFill>
-                  <a:srgbClr val="ffffff"/>
-                </a:solidFill>
-              </a:uFill>
-              <a:latin typeface="Times New Roman"/>
-            </a:endParaRPr>
-          </a:p>
-        </p:txBody>
-      </p:sp>
-      <p:sp>
-        <p:nvSpPr>
-          <p:cNvPr id="3" name="PlaceHolder 4"/>
-          <p:cNvSpPr>
-            <a:spLocks noGrp="1"/>
-          </p:cNvSpPr>
-          <p:nvPr>
-            <p:ph type="ftr"/>
-          </p:nvPr>
-        </p:nvSpPr>
-        <p:spPr>
-          <a:xfrm>
-            <a:off x="3447360" y="6887160"/>
-            <a:ext cx="3195000" cy="521280"/>
-          </a:xfrm>
-          <a:prstGeom prst="rect">
-            <a:avLst/>
-          </a:prstGeom>
-        </p:spPr>
-        <p:txBody>
-          <a:bodyPr lIns="0" rIns="0" tIns="0" bIns="0"/>
-          <a:p>
-            <a:pPr algn="ctr"/>
-            <a:r>
-              <a:rPr b="0" lang="en-US" sz="1400" spc="-1" strike="noStrike">
-                <a:solidFill>
-                  <a:srgbClr val="000000"/>
-                </a:solidFill>
-                <a:uFill>
-                  <a:solidFill>
-                    <a:srgbClr val="ffffff"/>
-                  </a:solidFill>
-                </a:uFill>
-                <a:latin typeface="Times New Roman"/>
-              </a:rPr>
-              <a:t>&lt;footer&gt;</a:t>
-            </a:r>
-            <a:endParaRPr b="0" lang="en-US" sz="1400" spc="-1" strike="noStrike">
-              <a:solidFill>
-                <a:srgbClr val="000000"/>
-              </a:solidFill>
-              <a:uFill>
-                <a:solidFill>
-                  <a:srgbClr val="ffffff"/>
-                </a:solidFill>
-              </a:uFill>
-              <a:latin typeface="Times New Roman"/>
-            </a:endParaRPr>
-          </a:p>
-        </p:txBody>
-      </p:sp>
-      <p:sp>
-        <p:nvSpPr>
-          <p:cNvPr id="4" name="PlaceHolder 5"/>
-          <p:cNvSpPr>
-            <a:spLocks noGrp="1"/>
-          </p:cNvSpPr>
-          <p:nvPr>
-            <p:ph type="sldNum"/>
-          </p:nvPr>
-        </p:nvSpPr>
-        <p:spPr>
-          <a:xfrm>
-            <a:off x="7227360" y="6887160"/>
-            <a:ext cx="2348280" cy="521280"/>
-          </a:xfrm>
-          <a:prstGeom prst="rect">
-            <a:avLst/>
-          </a:prstGeom>
-        </p:spPr>
-        <p:txBody>
-          <a:bodyPr lIns="0" rIns="0" tIns="0" bIns="0"/>
-          <a:p>
-            <a:pPr algn="r"/>
-            <a:fld id="{763C61F2-91F0-4806-A19F-C337F33D6806}" type="slidenum">
-              <a:rPr b="0" lang="en-US" sz="1400" spc="-1" strike="noStrike">
-                <a:solidFill>
-                  <a:srgbClr val="000000"/>
-                </a:solidFill>
-                <a:uFill>
-                  <a:solidFill>
-                    <a:srgbClr val="ffffff"/>
-                  </a:solidFill>
-                </a:uFill>
-                <a:latin typeface="Times New Roman"/>
-              </a:rPr>
-              <a:t>&lt;number&gt;</a:t>
-            </a:fld>
-            <a:endParaRPr b="0" lang="en-US" sz="1400" spc="-1" strike="noStrike">
-              <a:solidFill>
-                <a:srgbClr val="000000"/>
-              </a:solidFill>
-              <a:uFill>
-                <a:solidFill>
-                  <a:srgbClr val="ffffff"/>
-                </a:solidFill>
-              </a:uFill>
-              <a:latin typeface="Times New Roman"/>
-            </a:endParaRPr>
-          </a:p>
-        </p:txBody>
-      </p:sp>
     </p:spTree>
   </p:cSld>
   <p:clrMap bg1="lt1" bg2="lt2" tx1="dk1" tx2="dk2" accent1="accent1" accent2="accent2" accent3="accent3" accent4="accent4" accent5="accent5" accent6="accent6" hlink="hlink" folHlink="folHlink"/>
@@ -2055,14 +1542,14 @@
       </p:grpSpPr>
       <p:sp>
         <p:nvSpPr>
-          <p:cNvPr id="39" name="CustomShape 1"/>
+          <p:cNvPr id="34" name="CustomShape 1"/>
           <p:cNvSpPr/>
           <p:nvPr/>
         </p:nvSpPr>
         <p:spPr>
           <a:xfrm>
-            <a:off x="731520" y="1687680"/>
-            <a:ext cx="8595360" cy="4846320"/>
+            <a:off x="3275280" y="2551680"/>
+            <a:ext cx="5943240" cy="3067200"/>
           </a:xfrm>
           <a:prstGeom prst="rect">
             <a:avLst/>
@@ -2085,44 +1572,14 @@
       </p:sp>
       <p:sp>
         <p:nvSpPr>
-          <p:cNvPr id="40" name="CustomShape 2"/>
+          <p:cNvPr id="35" name="CustomShape 2"/>
           <p:cNvSpPr/>
           <p:nvPr/>
         </p:nvSpPr>
         <p:spPr>
           <a:xfrm>
-            <a:off x="1005840" y="3150720"/>
-            <a:ext cx="7955280" cy="3017520"/>
-          </a:xfrm>
-          <a:prstGeom prst="rect">
-            <a:avLst/>
-          </a:prstGeom>
-          <a:solidFill>
-            <a:srgbClr val="ffffff"/>
-          </a:solidFill>
-          <a:ln>
-            <a:solidFill>
-              <a:srgbClr val="000000"/>
-            </a:solidFill>
-          </a:ln>
-        </p:spPr>
-        <p:style>
-          <a:lnRef idx="0"/>
-          <a:fillRef idx="0"/>
-          <a:effectRef idx="0"/>
-          <a:fontRef idx="minor"/>
-        </p:style>
-      </p:sp>
-      <p:sp>
-        <p:nvSpPr>
-          <p:cNvPr id="41" name="CustomShape 3"/>
-          <p:cNvSpPr/>
-          <p:nvPr/>
-        </p:nvSpPr>
-        <p:spPr>
-          <a:xfrm>
-            <a:off x="3657600" y="2053440"/>
-            <a:ext cx="2560320" cy="914400"/>
+            <a:off x="3549600" y="2917440"/>
+            <a:ext cx="2559960" cy="914040"/>
           </a:xfrm>
           <a:prstGeom prst="rect">
             <a:avLst/>
@@ -2145,7 +1602,11 @@
         <p:txBody>
           <a:bodyPr wrap="none" lIns="90000" rIns="90000" tIns="45000" bIns="45000" anchor="ctr"/>
           <a:p>
-            <a:pPr algn="ctr"/>
+            <a:pPr algn="ctr">
+              <a:lnSpc>
+                <a:spcPct val="100000"/>
+              </a:lnSpc>
+            </a:pPr>
             <a:r>
               <a:rPr b="0" lang="en-US" sz="1800" spc="-1" strike="noStrike">
                 <a:solidFill>
@@ -2157,6 +1618,7 @@
                   </a:solidFill>
                 </a:uFill>
                 <a:latin typeface="Arial"/>
+                <a:ea typeface="DejaVu Sans"/>
               </a:rPr>
               <a:t>FusionEKF.h</a:t>
             </a:r>
@@ -2176,14 +1638,14 @@
       </p:sp>
       <p:sp>
         <p:nvSpPr>
-          <p:cNvPr id="42" name="CustomShape 4"/>
+          <p:cNvPr id="36" name="CustomShape 3"/>
           <p:cNvSpPr/>
           <p:nvPr/>
         </p:nvSpPr>
         <p:spPr>
           <a:xfrm>
-            <a:off x="4003920" y="3699360"/>
-            <a:ext cx="1828800" cy="744480"/>
+            <a:off x="3895920" y="4563360"/>
+            <a:ext cx="1828440" cy="744120"/>
           </a:xfrm>
           <a:prstGeom prst="rect">
             <a:avLst/>
@@ -2206,7 +1668,11 @@
         <p:txBody>
           <a:bodyPr wrap="none" lIns="90000" rIns="90000" tIns="45000" bIns="45000" anchor="ctr"/>
           <a:p>
-            <a:pPr algn="ctr"/>
+            <a:pPr algn="ctr">
+              <a:lnSpc>
+                <a:spcPct val="100000"/>
+              </a:lnSpc>
+            </a:pPr>
             <a:r>
               <a:rPr b="0" lang="en-US" sz="1800" spc="-1" strike="noStrike">
                 <a:solidFill>
@@ -2218,6 +1684,7 @@
                   </a:solidFill>
                 </a:uFill>
                 <a:latin typeface="Arial"/>
+                <a:ea typeface="DejaVu Sans"/>
               </a:rPr>
               <a:t>kalman_filter.h</a:t>
             </a:r>
@@ -2237,14 +1704,14 @@
       </p:sp>
       <p:sp>
         <p:nvSpPr>
-          <p:cNvPr id="43" name="Line 5"/>
+          <p:cNvPr id="37" name="Line 4"/>
           <p:cNvSpPr/>
           <p:nvPr/>
         </p:nvSpPr>
         <p:spPr>
           <a:xfrm flipV="1">
-            <a:off x="4937760" y="2967840"/>
-            <a:ext cx="0" cy="731520"/>
+            <a:off x="4829760" y="3831840"/>
+            <a:ext cx="360" cy="731520"/>
           </a:xfrm>
           <a:prstGeom prst="line">
             <a:avLst/>
@@ -2265,14 +1732,14 @@
       </p:sp>
       <p:sp>
         <p:nvSpPr>
-          <p:cNvPr id="44" name="CustomShape 6"/>
+          <p:cNvPr id="38" name="CustomShape 5"/>
           <p:cNvSpPr/>
           <p:nvPr/>
         </p:nvSpPr>
         <p:spPr>
           <a:xfrm>
-            <a:off x="1280160" y="3425040"/>
-            <a:ext cx="1371600" cy="640080"/>
+            <a:off x="7207200" y="1778760"/>
+            <a:ext cx="1371240" cy="639720"/>
           </a:xfrm>
           <a:prstGeom prst="rect">
             <a:avLst/>
@@ -2295,7 +1762,11 @@
         <p:txBody>
           <a:bodyPr wrap="none" lIns="90000" rIns="90000" tIns="45000" bIns="45000" anchor="ctr"/>
           <a:p>
-            <a:pPr algn="ctr"/>
+            <a:pPr algn="ctr">
+              <a:lnSpc>
+                <a:spcPct val="100000"/>
+              </a:lnSpc>
+            </a:pPr>
             <a:r>
               <a:rPr b="0" lang="en-US" sz="1800" spc="-1" strike="noStrike">
                 <a:solidFill>
@@ -2307,8 +1778,9 @@
                   </a:solidFill>
                 </a:uFill>
                 <a:latin typeface="Arial"/>
+                <a:ea typeface="DejaVu Sans"/>
               </a:rPr>
-              <a:t>tools.h</a:t>
+              <a:t>json.h</a:t>
             </a:r>
             <a:endParaRPr b="0" lang="en-US" sz="1800" spc="-1" strike="noStrike">
               <a:solidFill>
@@ -2326,14 +1798,14 @@
       </p:sp>
       <p:sp>
         <p:nvSpPr>
-          <p:cNvPr id="45" name="Line 7"/>
+          <p:cNvPr id="39" name="Line 6"/>
           <p:cNvSpPr/>
           <p:nvPr/>
         </p:nvSpPr>
         <p:spPr>
-          <a:xfrm flipV="1">
-            <a:off x="2651760" y="2967840"/>
-            <a:ext cx="1737360" cy="731520"/>
+          <a:xfrm flipH="1">
+            <a:off x="5325840" y="1923840"/>
+            <a:ext cx="1881360" cy="0"/>
           </a:xfrm>
           <a:prstGeom prst="line">
             <a:avLst/>
@@ -2354,14 +1826,14 @@
       </p:sp>
       <p:sp>
         <p:nvSpPr>
-          <p:cNvPr id="46" name="CustomShape 8"/>
+          <p:cNvPr id="40" name="CustomShape 7"/>
           <p:cNvSpPr/>
           <p:nvPr/>
         </p:nvSpPr>
         <p:spPr>
           <a:xfrm>
-            <a:off x="1371600" y="4979520"/>
-            <a:ext cx="1828800" cy="731520"/>
+            <a:off x="6018480" y="4613040"/>
+            <a:ext cx="3017160" cy="731160"/>
           </a:xfrm>
           <a:prstGeom prst="rect">
             <a:avLst/>
@@ -2384,7 +1856,11 @@
         <p:txBody>
           <a:bodyPr wrap="none" lIns="90000" rIns="90000" tIns="45000" bIns="45000" anchor="ctr"/>
           <a:p>
-            <a:pPr algn="ctr"/>
+            <a:pPr algn="ctr">
+              <a:lnSpc>
+                <a:spcPct val="100000"/>
+              </a:lnSpc>
+            </a:pPr>
             <a:r>
               <a:rPr b="0" lang="en-US" sz="1800" spc="-1" strike="noStrike">
                 <a:solidFill>
@@ -2396,8 +1872,9 @@
                   </a:solidFill>
                 </a:uFill>
                 <a:latin typeface="Arial"/>
+                <a:ea typeface="DejaVu Sans"/>
               </a:rPr>
-              <a:t>Eigen/Dense</a:t>
+              <a:t>measurement_package.h</a:t>
             </a:r>
             <a:endParaRPr b="0" lang="en-US" sz="1800" spc="-1" strike="noStrike">
               <a:solidFill>
@@ -2415,14 +1892,42 @@
       </p:sp>
       <p:sp>
         <p:nvSpPr>
-          <p:cNvPr id="47" name="CustomShape 9"/>
+          <p:cNvPr id="41" name="Line 8"/>
           <p:cNvSpPr/>
           <p:nvPr/>
         </p:nvSpPr>
         <p:spPr>
-          <a:xfrm>
-            <a:off x="7167600" y="3699360"/>
-            <a:ext cx="1371600" cy="640080"/>
+          <a:xfrm flipH="1" flipV="1">
+            <a:off x="5469840" y="3831840"/>
+            <a:ext cx="1920240" cy="781200"/>
+          </a:xfrm>
+          <a:prstGeom prst="line">
+            <a:avLst/>
+          </a:prstGeom>
+          <a:ln>
+            <a:solidFill>
+              <a:srgbClr val="000000"/>
+            </a:solidFill>
+            <a:tailEnd len="med" type="triangle" w="med"/>
+          </a:ln>
+        </p:spPr>
+        <p:style>
+          <a:lnRef idx="0"/>
+          <a:fillRef idx="0"/>
+          <a:effectRef idx="0"/>
+          <a:fontRef idx="minor"/>
+        </p:style>
+      </p:sp>
+      <p:sp>
+        <p:nvSpPr>
+          <p:cNvPr id="42" name="CustomShape 9"/>
+          <p:cNvSpPr/>
+          <p:nvPr/>
+        </p:nvSpPr>
+        <p:spPr>
+          <a:xfrm>
+            <a:off x="4317120" y="1545840"/>
+            <a:ext cx="1005480" cy="456840"/>
           </a:xfrm>
           <a:prstGeom prst="rect">
             <a:avLst/>
@@ -2445,7 +1950,11 @@
         <p:txBody>
           <a:bodyPr wrap="none" lIns="90000" rIns="90000" tIns="45000" bIns="45000" anchor="ctr"/>
           <a:p>
-            <a:pPr algn="ctr"/>
+            <a:pPr algn="ctr">
+              <a:lnSpc>
+                <a:spcPct val="100000"/>
+              </a:lnSpc>
+            </a:pPr>
             <a:r>
               <a:rPr b="0" lang="en-US" sz="1800" spc="-1" strike="noStrike">
                 <a:solidFill>
@@ -2457,8 +1966,9 @@
                   </a:solidFill>
                 </a:uFill>
                 <a:latin typeface="Arial"/>
+                <a:ea typeface="DejaVu Sans"/>
               </a:rPr>
-              <a:t>json.h</a:t>
+              <a:t>main.cpp</a:t>
             </a:r>
             <a:endParaRPr b="0" lang="en-US" sz="1800" spc="-1" strike="noStrike">
               <a:solidFill>
@@ -2476,14 +1986,14 @@
       </p:sp>
       <p:sp>
         <p:nvSpPr>
-          <p:cNvPr id="48" name="Line 10"/>
+          <p:cNvPr id="43" name="Line 10"/>
           <p:cNvSpPr/>
           <p:nvPr/>
         </p:nvSpPr>
         <p:spPr>
-          <a:xfrm flipH="1" flipV="1">
-            <a:off x="5577840" y="2967840"/>
-            <a:ext cx="2286000" cy="731520"/>
+          <a:xfrm flipV="1">
+            <a:off x="4829760" y="2003040"/>
+            <a:ext cx="360" cy="548640"/>
           </a:xfrm>
           <a:prstGeom prst="line">
             <a:avLst/>
@@ -2504,14 +2014,14 @@
       </p:sp>
       <p:sp>
         <p:nvSpPr>
-          <p:cNvPr id="49" name="Line 11"/>
+          <p:cNvPr id="44" name="Line 11"/>
           <p:cNvSpPr/>
           <p:nvPr/>
         </p:nvSpPr>
         <p:spPr>
-          <a:xfrm flipH="1" flipV="1">
-            <a:off x="1920240" y="4065120"/>
-            <a:ext cx="365760" cy="914400"/>
+          <a:xfrm>
+            <a:off x="5322960" y="1728720"/>
+            <a:ext cx="4353120" cy="360"/>
           </a:xfrm>
           <a:prstGeom prst="line">
             <a:avLst/>
@@ -2532,25 +2042,23 @@
       </p:sp>
       <p:sp>
         <p:nvSpPr>
-          <p:cNvPr id="50" name="CustomShape 12"/>
+          <p:cNvPr id="45" name="Line 12"/>
           <p:cNvSpPr/>
           <p:nvPr/>
         </p:nvSpPr>
         <p:spPr>
           <a:xfrm>
-            <a:off x="5649840" y="4796640"/>
-            <a:ext cx="3017520" cy="731520"/>
-          </a:xfrm>
-          <a:prstGeom prst="rect">
-            <a:avLst/>
-          </a:prstGeom>
-          <a:solidFill>
-            <a:srgbClr val="ffffff"/>
-          </a:solidFill>
+            <a:off x="9676080" y="1728720"/>
+            <a:ext cx="0" cy="4271040"/>
+          </a:xfrm>
+          <a:prstGeom prst="line">
+            <a:avLst/>
+          </a:prstGeom>
           <a:ln>
             <a:solidFill>
-              <a:srgbClr val="3465a4"/>
+              <a:srgbClr val="000000"/>
             </a:solidFill>
+            <a:tailEnd len="med" type="triangle" w="med"/>
           </a:ln>
         </p:spPr>
         <p:style>
@@ -2559,48 +2067,17 @@
           <a:effectRef idx="0"/>
           <a:fontRef idx="minor"/>
         </p:style>
-        <p:txBody>
-          <a:bodyPr wrap="none" lIns="90000" rIns="90000" tIns="45000" bIns="45000" anchor="ctr"/>
-          <a:p>
-            <a:pPr algn="ctr"/>
-            <a:r>
-              <a:rPr b="0" lang="en-US" sz="1800" spc="-1" strike="noStrike">
-                <a:solidFill>
-                  <a:srgbClr val="000000"/>
-                </a:solidFill>
-                <a:uFill>
-                  <a:solidFill>
-                    <a:srgbClr val="ffffff"/>
-                  </a:solidFill>
-                </a:uFill>
-                <a:latin typeface="Arial"/>
-              </a:rPr>
-              <a:t>measurement_package.h</a:t>
-            </a:r>
-            <a:endParaRPr b="0" lang="en-US" sz="1800" spc="-1" strike="noStrike">
-              <a:solidFill>
-                <a:srgbClr val="000000"/>
-              </a:solidFill>
-              <a:uFill>
-                <a:solidFill>
-                  <a:srgbClr val="ffffff"/>
-                </a:solidFill>
-              </a:uFill>
-              <a:latin typeface="Arial"/>
-            </a:endParaRPr>
-          </a:p>
-        </p:txBody>
-      </p:sp>
-      <p:sp>
-        <p:nvSpPr>
-          <p:cNvPr id="51" name="Line 13"/>
+      </p:sp>
+      <p:sp>
+        <p:nvSpPr>
+          <p:cNvPr id="46" name="Line 13"/>
           <p:cNvSpPr/>
           <p:nvPr/>
         </p:nvSpPr>
         <p:spPr>
-          <a:xfrm flipV="1">
-            <a:off x="3200400" y="5162400"/>
-            <a:ext cx="2449440" cy="182880"/>
+          <a:xfrm flipH="1">
+            <a:off x="4738320" y="5999760"/>
+            <a:ext cx="4937760" cy="360"/>
           </a:xfrm>
           <a:prstGeom prst="line">
             <a:avLst/>
@@ -2621,14 +2098,14 @@
       </p:sp>
       <p:sp>
         <p:nvSpPr>
-          <p:cNvPr id="52" name="Line 14"/>
+          <p:cNvPr id="47" name="Line 14"/>
           <p:cNvSpPr/>
           <p:nvPr/>
         </p:nvSpPr>
         <p:spPr>
-          <a:xfrm flipH="1" flipV="1">
-            <a:off x="5577840" y="2967840"/>
-            <a:ext cx="1463040" cy="1828800"/>
+          <a:xfrm flipV="1">
+            <a:off x="4738320" y="5634000"/>
+            <a:ext cx="360" cy="365760"/>
           </a:xfrm>
           <a:prstGeom prst="line">
             <a:avLst/>
@@ -2649,23 +2126,21 @@
       </p:sp>
       <p:sp>
         <p:nvSpPr>
-          <p:cNvPr id="53" name="Line 15"/>
+          <p:cNvPr id="48" name="CustomShape 15"/>
           <p:cNvSpPr/>
           <p:nvPr/>
         </p:nvSpPr>
         <p:spPr>
-          <a:xfrm flipV="1">
-            <a:off x="3200400" y="4443840"/>
-            <a:ext cx="1737360" cy="901440"/>
-          </a:xfrm>
-          <a:prstGeom prst="line">
-            <a:avLst/>
-          </a:prstGeom>
+          <a:xfrm>
+            <a:off x="6453000" y="2620800"/>
+            <a:ext cx="2745360" cy="345960"/>
+          </a:xfrm>
+          <a:prstGeom prst="rect">
+            <a:avLst/>
+          </a:prstGeom>
+          <a:noFill/>
           <a:ln>
-            <a:solidFill>
-              <a:srgbClr val="000000"/>
-            </a:solidFill>
-            <a:tailEnd len="med" type="triangle" w="med"/>
+            <a:noFill/>
           </a:ln>
         </p:spPr>
         <p:style>
@@ -2674,255 +2149,6 @@
           <a:effectRef idx="0"/>
           <a:fontRef idx="minor"/>
         </p:style>
-      </p:sp>
-      <p:sp>
-        <p:nvSpPr>
-          <p:cNvPr id="54" name="Line 16"/>
-          <p:cNvSpPr/>
-          <p:nvPr/>
-        </p:nvSpPr>
-        <p:spPr>
-          <a:xfrm flipV="1">
-            <a:off x="2286000" y="2967840"/>
-            <a:ext cx="2286000" cy="2011680"/>
-          </a:xfrm>
-          <a:prstGeom prst="line">
-            <a:avLst/>
-          </a:prstGeom>
-          <a:ln>
-            <a:solidFill>
-              <a:srgbClr val="000000"/>
-            </a:solidFill>
-            <a:tailEnd len="med" type="triangle" w="med"/>
-          </a:ln>
-        </p:spPr>
-        <p:style>
-          <a:lnRef idx="0"/>
-          <a:fillRef idx="0"/>
-          <a:effectRef idx="0"/>
-          <a:fontRef idx="minor"/>
-        </p:style>
-      </p:sp>
-      <p:sp>
-        <p:nvSpPr>
-          <p:cNvPr id="55" name="CustomShape 17"/>
-          <p:cNvSpPr/>
-          <p:nvPr/>
-        </p:nvSpPr>
-        <p:spPr>
-          <a:xfrm>
-            <a:off x="4425120" y="681840"/>
-            <a:ext cx="1005840" cy="457200"/>
-          </a:xfrm>
-          <a:prstGeom prst="rect">
-            <a:avLst/>
-          </a:prstGeom>
-          <a:solidFill>
-            <a:srgbClr val="ffffff"/>
-          </a:solidFill>
-          <a:ln>
-            <a:solidFill>
-              <a:srgbClr val="3465a4"/>
-            </a:solidFill>
-          </a:ln>
-        </p:spPr>
-        <p:style>
-          <a:lnRef idx="0"/>
-          <a:fillRef idx="0"/>
-          <a:effectRef idx="0"/>
-          <a:fontRef idx="minor"/>
-        </p:style>
-        <p:txBody>
-          <a:bodyPr wrap="none" lIns="90000" rIns="90000" tIns="45000" bIns="45000" anchor="ctr"/>
-          <a:p>
-            <a:pPr algn="ctr"/>
-            <a:r>
-              <a:rPr b="0" lang="en-US" sz="1800" spc="-1" strike="noStrike">
-                <a:solidFill>
-                  <a:srgbClr val="000000"/>
-                </a:solidFill>
-                <a:uFill>
-                  <a:solidFill>
-                    <a:srgbClr val="ffffff"/>
-                  </a:solidFill>
-                </a:uFill>
-                <a:latin typeface="Arial"/>
-              </a:rPr>
-              <a:t>main.cpp</a:t>
-            </a:r>
-            <a:endParaRPr b="0" lang="en-US" sz="1800" spc="-1" strike="noStrike">
-              <a:solidFill>
-                <a:srgbClr val="000000"/>
-              </a:solidFill>
-              <a:uFill>
-                <a:solidFill>
-                  <a:srgbClr val="ffffff"/>
-                </a:solidFill>
-              </a:uFill>
-              <a:latin typeface="Arial"/>
-            </a:endParaRPr>
-          </a:p>
-        </p:txBody>
-      </p:sp>
-      <p:sp>
-        <p:nvSpPr>
-          <p:cNvPr id="56" name="Line 18"/>
-          <p:cNvSpPr/>
-          <p:nvPr/>
-        </p:nvSpPr>
-        <p:spPr>
-          <a:xfrm flipV="1">
-            <a:off x="4937760" y="1139040"/>
-            <a:ext cx="0" cy="548640"/>
-          </a:xfrm>
-          <a:prstGeom prst="line">
-            <a:avLst/>
-          </a:prstGeom>
-          <a:ln>
-            <a:solidFill>
-              <a:srgbClr val="000000"/>
-            </a:solidFill>
-            <a:tailEnd len="med" type="triangle" w="med"/>
-          </a:ln>
-        </p:spPr>
-        <p:style>
-          <a:lnRef idx="0"/>
-          <a:fillRef idx="0"/>
-          <a:effectRef idx="0"/>
-          <a:fontRef idx="minor"/>
-        </p:style>
-      </p:sp>
-      <p:sp>
-        <p:nvSpPr>
-          <p:cNvPr id="57" name="Line 19"/>
-          <p:cNvSpPr/>
-          <p:nvPr/>
-        </p:nvSpPr>
-        <p:spPr>
-          <a:xfrm>
-            <a:off x="5430960" y="864720"/>
-            <a:ext cx="4353120" cy="0"/>
-          </a:xfrm>
-          <a:prstGeom prst="line">
-            <a:avLst/>
-          </a:prstGeom>
-          <a:ln>
-            <a:solidFill>
-              <a:srgbClr val="000000"/>
-            </a:solidFill>
-            <a:tailEnd len="med" type="triangle" w="med"/>
-          </a:ln>
-        </p:spPr>
-        <p:style>
-          <a:lnRef idx="0"/>
-          <a:fillRef idx="0"/>
-          <a:effectRef idx="0"/>
-          <a:fontRef idx="minor"/>
-        </p:style>
-      </p:sp>
-      <p:sp>
-        <p:nvSpPr>
-          <p:cNvPr id="58" name="Line 20"/>
-          <p:cNvSpPr/>
-          <p:nvPr/>
-        </p:nvSpPr>
-        <p:spPr>
-          <a:xfrm>
-            <a:off x="9784080" y="864720"/>
-            <a:ext cx="0" cy="6035040"/>
-          </a:xfrm>
-          <a:prstGeom prst="line">
-            <a:avLst/>
-          </a:prstGeom>
-          <a:ln>
-            <a:solidFill>
-              <a:srgbClr val="000000"/>
-            </a:solidFill>
-            <a:tailEnd len="med" type="triangle" w="med"/>
-          </a:ln>
-        </p:spPr>
-        <p:style>
-          <a:lnRef idx="0"/>
-          <a:fillRef idx="0"/>
-          <a:effectRef idx="0"/>
-          <a:fontRef idx="minor"/>
-        </p:style>
-      </p:sp>
-      <p:sp>
-        <p:nvSpPr>
-          <p:cNvPr id="59" name="Line 21"/>
-          <p:cNvSpPr/>
-          <p:nvPr/>
-        </p:nvSpPr>
-        <p:spPr>
-          <a:xfrm flipH="1">
-            <a:off x="4846320" y="6899760"/>
-            <a:ext cx="4937760" cy="0"/>
-          </a:xfrm>
-          <a:prstGeom prst="line">
-            <a:avLst/>
-          </a:prstGeom>
-          <a:ln>
-            <a:solidFill>
-              <a:srgbClr val="000000"/>
-            </a:solidFill>
-            <a:tailEnd len="med" type="triangle" w="med"/>
-          </a:ln>
-        </p:spPr>
-        <p:style>
-          <a:lnRef idx="0"/>
-          <a:fillRef idx="0"/>
-          <a:effectRef idx="0"/>
-          <a:fontRef idx="minor"/>
-        </p:style>
-      </p:sp>
-      <p:sp>
-        <p:nvSpPr>
-          <p:cNvPr id="60" name="Line 22"/>
-          <p:cNvSpPr/>
-          <p:nvPr/>
-        </p:nvSpPr>
-        <p:spPr>
-          <a:xfrm flipV="1">
-            <a:off x="4846320" y="6534000"/>
-            <a:ext cx="0" cy="365760"/>
-          </a:xfrm>
-          <a:prstGeom prst="line">
-            <a:avLst/>
-          </a:prstGeom>
-          <a:ln>
-            <a:solidFill>
-              <a:srgbClr val="000000"/>
-            </a:solidFill>
-            <a:tailEnd len="med" type="triangle" w="med"/>
-          </a:ln>
-        </p:spPr>
-        <p:style>
-          <a:lnRef idx="0"/>
-          <a:fillRef idx="0"/>
-          <a:effectRef idx="0"/>
-          <a:fontRef idx="minor"/>
-        </p:style>
-      </p:sp>
-      <p:sp>
-        <p:nvSpPr>
-          <p:cNvPr id="61" name="TextShape 23"/>
-          <p:cNvSpPr txBox="1"/>
-          <p:nvPr/>
-        </p:nvSpPr>
-        <p:spPr>
-          <a:xfrm>
-            <a:off x="729000" y="1756800"/>
-            <a:ext cx="2745720" cy="346320"/>
-          </a:xfrm>
-          <a:prstGeom prst="rect">
-            <a:avLst/>
-          </a:prstGeom>
-          <a:noFill/>
-          <a:ln>
-            <a:noFill/>
-          </a:ln>
-        </p:spPr>
         <p:txBody>
           <a:bodyPr lIns="90000" rIns="90000" tIns="45000" bIns="45000"/>
           <a:p>
@@ -2940,30 +2166,30 @@
               </a:rPr>
               <a:t>Extended-Kalman-Filter</a:t>
             </a:r>
-            <a:endParaRPr b="1" lang="en-US" sz="1800" spc="-1" strike="noStrike">
-              <a:solidFill>
-                <a:srgbClr val="000000"/>
-              </a:solidFill>
-              <a:uFill>
-                <a:solidFill>
-                  <a:srgbClr val="ffffff"/>
-                </a:solidFill>
-              </a:uFill>
-              <a:latin typeface="Arial"/>
-            </a:endParaRPr>
-          </a:p>
-        </p:txBody>
-      </p:sp>
-      <p:sp>
-        <p:nvSpPr>
-          <p:cNvPr id="62" name="TextShape 24"/>
-          <p:cNvSpPr txBox="1"/>
+            <a:endParaRPr b="0" lang="en-US" sz="1800" spc="-1" strike="noStrike">
+              <a:solidFill>
+                <a:srgbClr val="000000"/>
+              </a:solidFill>
+              <a:uFill>
+                <a:solidFill>
+                  <a:srgbClr val="ffffff"/>
+                </a:solidFill>
+              </a:uFill>
+              <a:latin typeface="Arial"/>
+            </a:endParaRPr>
+          </a:p>
+        </p:txBody>
+      </p:sp>
+      <p:sp>
+        <p:nvSpPr>
+          <p:cNvPr id="49" name="CustomShape 16"/>
+          <p:cNvSpPr/>
           <p:nvPr/>
         </p:nvSpPr>
         <p:spPr>
           <a:xfrm>
-            <a:off x="5997600" y="548640"/>
-            <a:ext cx="2323440" cy="346320"/>
+            <a:off x="5889600" y="1412640"/>
+            <a:ext cx="2323080" cy="345960"/>
           </a:xfrm>
           <a:prstGeom prst="rect">
             <a:avLst/>
@@ -2973,10 +2199,20 @@
             <a:noFill/>
           </a:ln>
         </p:spPr>
+        <p:style>
+          <a:lnRef idx="0"/>
+          <a:fillRef idx="0"/>
+          <a:effectRef idx="0"/>
+          <a:fontRef idx="minor"/>
+        </p:style>
         <p:txBody>
           <a:bodyPr lIns="90000" rIns="90000" tIns="45000" bIns="45000"/>
           <a:p>
-            <a:pPr algn="ctr"/>
+            <a:pPr algn="ctr">
+              <a:lnSpc>
+                <a:spcPct val="100000"/>
+              </a:lnSpc>
+            </a:pPr>
             <a:r>
               <a:rPr b="0" lang="en-US" sz="1800" spc="-1" strike="noStrike">
                 <a:solidFill>
@@ -3007,14 +2243,14 @@
       </p:sp>
       <p:sp>
         <p:nvSpPr>
-          <p:cNvPr id="63" name="TextShape 25"/>
-          <p:cNvSpPr txBox="1"/>
+          <p:cNvPr id="50" name="CustomShape 17"/>
+          <p:cNvSpPr/>
           <p:nvPr/>
         </p:nvSpPr>
         <p:spPr>
           <a:xfrm>
-            <a:off x="4937760" y="1280160"/>
-            <a:ext cx="1220040" cy="346320"/>
+            <a:off x="4829760" y="2144160"/>
+            <a:ext cx="1219680" cy="345960"/>
           </a:xfrm>
           <a:prstGeom prst="rect">
             <a:avLst/>
@@ -3024,6 +2260,12 @@
             <a:noFill/>
           </a:ln>
         </p:spPr>
+        <p:style>
+          <a:lnRef idx="0"/>
+          <a:fillRef idx="0"/>
+          <a:effectRef idx="0"/>
+          <a:fontRef idx="minor"/>
+        </p:style>
         <p:txBody>
           <a:bodyPr lIns="90000" rIns="90000" tIns="45000" bIns="45000"/>
           <a:p>
@@ -3054,6 +2296,601 @@
             </a:endParaRPr>
           </a:p>
         </p:txBody>
+      </p:sp>
+      <p:sp>
+        <p:nvSpPr>
+          <p:cNvPr id="51" name="Line 18"/>
+          <p:cNvSpPr/>
+          <p:nvPr/>
+        </p:nvSpPr>
+        <p:spPr>
+          <a:xfrm flipV="1">
+            <a:off x="2452320" y="3831840"/>
+            <a:ext cx="2011680" cy="1285200"/>
+          </a:xfrm>
+          <a:prstGeom prst="line">
+            <a:avLst/>
+          </a:prstGeom>
+          <a:ln>
+            <a:solidFill>
+              <a:srgbClr val="000000"/>
+            </a:solidFill>
+            <a:tailEnd len="med" type="triangle" w="med"/>
+          </a:ln>
+        </p:spPr>
+        <p:style>
+          <a:lnRef idx="0"/>
+          <a:fillRef idx="0"/>
+          <a:effectRef idx="0"/>
+          <a:fontRef idx="minor"/>
+        </p:style>
+      </p:sp>
+      <p:sp>
+        <p:nvSpPr>
+          <p:cNvPr id="52" name="Line 19"/>
+          <p:cNvSpPr/>
+          <p:nvPr/>
+        </p:nvSpPr>
+        <p:spPr>
+          <a:xfrm flipV="1">
+            <a:off x="2086560" y="2002680"/>
+            <a:ext cx="2377440" cy="990360"/>
+          </a:xfrm>
+          <a:prstGeom prst="line">
+            <a:avLst/>
+          </a:prstGeom>
+          <a:ln>
+            <a:solidFill>
+              <a:srgbClr val="000000"/>
+            </a:solidFill>
+            <a:tailEnd len="med" type="triangle" w="med"/>
+          </a:ln>
+        </p:spPr>
+        <p:style>
+          <a:lnRef idx="0"/>
+          <a:fillRef idx="0"/>
+          <a:effectRef idx="0"/>
+          <a:fontRef idx="minor"/>
+        </p:style>
+      </p:sp>
+      <p:sp>
+        <p:nvSpPr>
+          <p:cNvPr id="53" name="CustomShape 20"/>
+          <p:cNvSpPr/>
+          <p:nvPr/>
+        </p:nvSpPr>
+        <p:spPr>
+          <a:xfrm>
+            <a:off x="1965600" y="1412640"/>
+            <a:ext cx="2323080" cy="345960"/>
+          </a:xfrm>
+          <a:prstGeom prst="rect">
+            <a:avLst/>
+          </a:prstGeom>
+          <a:noFill/>
+          <a:ln>
+            <a:noFill/>
+          </a:ln>
+        </p:spPr>
+        <p:style>
+          <a:lnRef idx="0"/>
+          <a:fillRef idx="0"/>
+          <a:effectRef idx="0"/>
+          <a:fontRef idx="minor"/>
+        </p:style>
+        <p:txBody>
+          <a:bodyPr lIns="90000" rIns="90000" tIns="45000" bIns="45000"/>
+          <a:p>
+            <a:pPr algn="ctr">
+              <a:lnSpc>
+                <a:spcPct val="100000"/>
+              </a:lnSpc>
+            </a:pPr>
+            <a:r>
+              <a:rPr b="0" lang="en-US" sz="1800" spc="-1" strike="noStrike">
+                <a:solidFill>
+                  <a:srgbClr val="000000"/>
+                </a:solidFill>
+                <a:uFill>
+                  <a:solidFill>
+                    <a:srgbClr val="ffffff"/>
+                  </a:solidFill>
+                </a:uFill>
+                <a:latin typeface="Arial"/>
+              </a:rPr>
+              <a:t>ground truth</a:t>
+            </a:r>
+            <a:endParaRPr b="0" lang="en-US" sz="1800" spc="-1" strike="noStrike">
+              <a:solidFill>
+                <a:srgbClr val="000000"/>
+              </a:solidFill>
+              <a:uFill>
+                <a:solidFill>
+                  <a:srgbClr val="ffffff"/>
+                </a:solidFill>
+              </a:uFill>
+              <a:latin typeface="Arial"/>
+            </a:endParaRPr>
+          </a:p>
+        </p:txBody>
+      </p:sp>
+      <p:sp>
+        <p:nvSpPr>
+          <p:cNvPr id="54" name="Line 21"/>
+          <p:cNvSpPr/>
+          <p:nvPr/>
+        </p:nvSpPr>
+        <p:spPr>
+          <a:xfrm>
+            <a:off x="1995120" y="1758600"/>
+            <a:ext cx="2322000" cy="0"/>
+          </a:xfrm>
+          <a:prstGeom prst="line">
+            <a:avLst/>
+          </a:prstGeom>
+          <a:ln>
+            <a:solidFill>
+              <a:srgbClr val="000000"/>
+            </a:solidFill>
+            <a:tailEnd len="med" type="triangle" w="med"/>
+          </a:ln>
+        </p:spPr>
+        <p:style>
+          <a:lnRef idx="0"/>
+          <a:fillRef idx="0"/>
+          <a:effectRef idx="0"/>
+          <a:fontRef idx="minor"/>
+        </p:style>
+      </p:sp>
+      <p:sp>
+        <p:nvSpPr>
+          <p:cNvPr id="55" name="CustomShape 22"/>
+          <p:cNvSpPr/>
+          <p:nvPr/>
+        </p:nvSpPr>
+        <p:spPr>
+          <a:xfrm>
+            <a:off x="1388160" y="2993040"/>
+            <a:ext cx="1371240" cy="639720"/>
+          </a:xfrm>
+          <a:prstGeom prst="rect">
+            <a:avLst/>
+          </a:prstGeom>
+          <a:solidFill>
+            <a:srgbClr val="ffffff"/>
+          </a:solidFill>
+          <a:ln>
+            <a:solidFill>
+              <a:srgbClr val="3465a4"/>
+            </a:solidFill>
+          </a:ln>
+        </p:spPr>
+        <p:style>
+          <a:lnRef idx="0"/>
+          <a:fillRef idx="0"/>
+          <a:effectRef idx="0"/>
+          <a:fontRef idx="minor"/>
+        </p:style>
+        <p:txBody>
+          <a:bodyPr wrap="none" lIns="90000" rIns="90000" tIns="45000" bIns="45000" anchor="ctr"/>
+          <a:p>
+            <a:pPr algn="ctr">
+              <a:lnSpc>
+                <a:spcPct val="100000"/>
+              </a:lnSpc>
+            </a:pPr>
+            <a:r>
+              <a:rPr b="0" lang="en-US" sz="1800" spc="-1" strike="noStrike">
+                <a:solidFill>
+                  <a:srgbClr val="000000"/>
+                </a:solidFill>
+                <a:uFill>
+                  <a:solidFill>
+                    <a:srgbClr val="ffffff"/>
+                  </a:solidFill>
+                </a:uFill>
+                <a:latin typeface="Arial"/>
+                <a:ea typeface="DejaVu Sans"/>
+              </a:rPr>
+              <a:t>tools.h</a:t>
+            </a:r>
+            <a:endParaRPr b="0" lang="en-US" sz="1800" spc="-1" strike="noStrike">
+              <a:solidFill>
+                <a:srgbClr val="000000"/>
+              </a:solidFill>
+              <a:uFill>
+                <a:solidFill>
+                  <a:srgbClr val="ffffff"/>
+                </a:solidFill>
+              </a:uFill>
+              <a:latin typeface="Arial"/>
+            </a:endParaRPr>
+          </a:p>
+        </p:txBody>
+      </p:sp>
+      <p:sp>
+        <p:nvSpPr>
+          <p:cNvPr id="56" name="CustomShape 23"/>
+          <p:cNvSpPr/>
+          <p:nvPr/>
+        </p:nvSpPr>
+        <p:spPr>
+          <a:xfrm>
+            <a:off x="930960" y="5117040"/>
+            <a:ext cx="1828440" cy="731160"/>
+          </a:xfrm>
+          <a:prstGeom prst="rect">
+            <a:avLst/>
+          </a:prstGeom>
+          <a:solidFill>
+            <a:srgbClr val="ffffff"/>
+          </a:solidFill>
+          <a:ln>
+            <a:solidFill>
+              <a:srgbClr val="3465a4"/>
+            </a:solidFill>
+          </a:ln>
+        </p:spPr>
+        <p:style>
+          <a:lnRef idx="0"/>
+          <a:fillRef idx="0"/>
+          <a:effectRef idx="0"/>
+          <a:fontRef idx="minor"/>
+        </p:style>
+        <p:txBody>
+          <a:bodyPr wrap="none" lIns="90000" rIns="90000" tIns="45000" bIns="45000" anchor="ctr"/>
+          <a:p>
+            <a:pPr algn="ctr">
+              <a:lnSpc>
+                <a:spcPct val="100000"/>
+              </a:lnSpc>
+            </a:pPr>
+            <a:r>
+              <a:rPr b="0" lang="en-US" sz="1800" spc="-1" strike="noStrike">
+                <a:solidFill>
+                  <a:srgbClr val="000000"/>
+                </a:solidFill>
+                <a:uFill>
+                  <a:solidFill>
+                    <a:srgbClr val="ffffff"/>
+                  </a:solidFill>
+                </a:uFill>
+                <a:latin typeface="Arial"/>
+                <a:ea typeface="DejaVu Sans"/>
+              </a:rPr>
+              <a:t>E</a:t>
+            </a:r>
+            <a:r>
+              <a:rPr b="0" lang="en-US" sz="1800" spc="-1" strike="noStrike">
+                <a:solidFill>
+                  <a:srgbClr val="000000"/>
+                </a:solidFill>
+                <a:uFill>
+                  <a:solidFill>
+                    <a:srgbClr val="ffffff"/>
+                  </a:solidFill>
+                </a:uFill>
+                <a:latin typeface="Arial"/>
+                <a:ea typeface="DejaVu Sans"/>
+              </a:rPr>
+              <a:t>i</a:t>
+            </a:r>
+            <a:r>
+              <a:rPr b="0" lang="en-US" sz="1800" spc="-1" strike="noStrike">
+                <a:solidFill>
+                  <a:srgbClr val="000000"/>
+                </a:solidFill>
+                <a:uFill>
+                  <a:solidFill>
+                    <a:srgbClr val="ffffff"/>
+                  </a:solidFill>
+                </a:uFill>
+                <a:latin typeface="Arial"/>
+                <a:ea typeface="DejaVu Sans"/>
+              </a:rPr>
+              <a:t>g</a:t>
+            </a:r>
+            <a:r>
+              <a:rPr b="0" lang="en-US" sz="1800" spc="-1" strike="noStrike">
+                <a:solidFill>
+                  <a:srgbClr val="000000"/>
+                </a:solidFill>
+                <a:uFill>
+                  <a:solidFill>
+                    <a:srgbClr val="ffffff"/>
+                  </a:solidFill>
+                </a:uFill>
+                <a:latin typeface="Arial"/>
+                <a:ea typeface="DejaVu Sans"/>
+              </a:rPr>
+              <a:t>e</a:t>
+            </a:r>
+            <a:r>
+              <a:rPr b="0" lang="en-US" sz="1800" spc="-1" strike="noStrike">
+                <a:solidFill>
+                  <a:srgbClr val="000000"/>
+                </a:solidFill>
+                <a:uFill>
+                  <a:solidFill>
+                    <a:srgbClr val="ffffff"/>
+                  </a:solidFill>
+                </a:uFill>
+                <a:latin typeface="Arial"/>
+                <a:ea typeface="DejaVu Sans"/>
+              </a:rPr>
+              <a:t>n</a:t>
+            </a:r>
+            <a:r>
+              <a:rPr b="0" lang="en-US" sz="1800" spc="-1" strike="noStrike">
+                <a:solidFill>
+                  <a:srgbClr val="000000"/>
+                </a:solidFill>
+                <a:uFill>
+                  <a:solidFill>
+                    <a:srgbClr val="ffffff"/>
+                  </a:solidFill>
+                </a:uFill>
+                <a:latin typeface="Arial"/>
+                <a:ea typeface="DejaVu Sans"/>
+              </a:rPr>
+              <a:t>/</a:t>
+            </a:r>
+            <a:r>
+              <a:rPr b="0" lang="en-US" sz="1800" spc="-1" strike="noStrike">
+                <a:solidFill>
+                  <a:srgbClr val="000000"/>
+                </a:solidFill>
+                <a:uFill>
+                  <a:solidFill>
+                    <a:srgbClr val="ffffff"/>
+                  </a:solidFill>
+                </a:uFill>
+                <a:latin typeface="Arial"/>
+                <a:ea typeface="DejaVu Sans"/>
+              </a:rPr>
+              <a:t>D</a:t>
+            </a:r>
+            <a:r>
+              <a:rPr b="0" lang="en-US" sz="1800" spc="-1" strike="noStrike">
+                <a:solidFill>
+                  <a:srgbClr val="000000"/>
+                </a:solidFill>
+                <a:uFill>
+                  <a:solidFill>
+                    <a:srgbClr val="ffffff"/>
+                  </a:solidFill>
+                </a:uFill>
+                <a:latin typeface="Arial"/>
+                <a:ea typeface="DejaVu Sans"/>
+              </a:rPr>
+              <a:t>e</a:t>
+            </a:r>
+            <a:r>
+              <a:rPr b="0" lang="en-US" sz="1800" spc="-1" strike="noStrike">
+                <a:solidFill>
+                  <a:srgbClr val="000000"/>
+                </a:solidFill>
+                <a:uFill>
+                  <a:solidFill>
+                    <a:srgbClr val="ffffff"/>
+                  </a:solidFill>
+                </a:uFill>
+                <a:latin typeface="Arial"/>
+                <a:ea typeface="DejaVu Sans"/>
+              </a:rPr>
+              <a:t>n</a:t>
+            </a:r>
+            <a:r>
+              <a:rPr b="0" lang="en-US" sz="1800" spc="-1" strike="noStrike">
+                <a:solidFill>
+                  <a:srgbClr val="000000"/>
+                </a:solidFill>
+                <a:uFill>
+                  <a:solidFill>
+                    <a:srgbClr val="ffffff"/>
+                  </a:solidFill>
+                </a:uFill>
+                <a:latin typeface="Arial"/>
+                <a:ea typeface="DejaVu Sans"/>
+              </a:rPr>
+              <a:t>s</a:t>
+            </a:r>
+            <a:r>
+              <a:rPr b="0" lang="en-US" sz="1800" spc="-1" strike="noStrike">
+                <a:solidFill>
+                  <a:srgbClr val="000000"/>
+                </a:solidFill>
+                <a:uFill>
+                  <a:solidFill>
+                    <a:srgbClr val="ffffff"/>
+                  </a:solidFill>
+                </a:uFill>
+                <a:latin typeface="Arial"/>
+                <a:ea typeface="DejaVu Sans"/>
+              </a:rPr>
+              <a:t>e</a:t>
+            </a:r>
+            <a:endParaRPr b="0" lang="en-US" sz="1800" spc="-1" strike="noStrike">
+              <a:solidFill>
+                <a:srgbClr val="000000"/>
+              </a:solidFill>
+              <a:uFill>
+                <a:solidFill>
+                  <a:srgbClr val="ffffff"/>
+                </a:solidFill>
+              </a:uFill>
+              <a:latin typeface="Arial"/>
+            </a:endParaRPr>
+          </a:p>
+        </p:txBody>
+      </p:sp>
+      <p:sp>
+        <p:nvSpPr>
+          <p:cNvPr id="57" name="Line 24"/>
+          <p:cNvSpPr/>
+          <p:nvPr/>
+        </p:nvSpPr>
+        <p:spPr>
+          <a:xfrm flipV="1">
+            <a:off x="2119680" y="3633120"/>
+            <a:ext cx="360" cy="1483920"/>
+          </a:xfrm>
+          <a:prstGeom prst="line">
+            <a:avLst/>
+          </a:prstGeom>
+          <a:ln>
+            <a:solidFill>
+              <a:srgbClr val="000000"/>
+            </a:solidFill>
+            <a:tailEnd len="med" type="triangle" w="med"/>
+          </a:ln>
+        </p:spPr>
+        <p:style>
+          <a:lnRef idx="0"/>
+          <a:fillRef idx="0"/>
+          <a:effectRef idx="0"/>
+          <a:fontRef idx="minor"/>
+        </p:style>
+      </p:sp>
+      <p:sp>
+        <p:nvSpPr>
+          <p:cNvPr id="58" name="CustomShape 25"/>
+          <p:cNvSpPr/>
+          <p:nvPr/>
+        </p:nvSpPr>
+        <p:spPr>
+          <a:xfrm>
+            <a:off x="414720" y="2476800"/>
+            <a:ext cx="2374920" cy="345960"/>
+          </a:xfrm>
+          <a:prstGeom prst="rect">
+            <a:avLst/>
+          </a:prstGeom>
+          <a:noFill/>
+          <a:ln>
+            <a:noFill/>
+          </a:ln>
+        </p:spPr>
+        <p:style>
+          <a:lnRef idx="0"/>
+          <a:fillRef idx="0"/>
+          <a:effectRef idx="0"/>
+          <a:fontRef idx="minor"/>
+        </p:style>
+        <p:txBody>
+          <a:bodyPr lIns="90000" rIns="90000" tIns="45000" bIns="45000"/>
+          <a:p>
+            <a:r>
+              <a:rPr b="1" lang="en-US" sz="1800" spc="-1" strike="noStrike">
+                <a:solidFill>
+                  <a:srgbClr val="000000"/>
+                </a:solidFill>
+                <a:uFill>
+                  <a:solidFill>
+                    <a:srgbClr val="ffffff"/>
+                  </a:solidFill>
+                </a:uFill>
+                <a:latin typeface="Arial"/>
+              </a:rPr>
+              <a:t>Performance: RMSE</a:t>
+            </a:r>
+            <a:endParaRPr b="0" lang="en-US" sz="1800" spc="-1" strike="noStrike">
+              <a:solidFill>
+                <a:srgbClr val="000000"/>
+              </a:solidFill>
+              <a:uFill>
+                <a:solidFill>
+                  <a:srgbClr val="ffffff"/>
+                </a:solidFill>
+              </a:uFill>
+              <a:latin typeface="Arial"/>
+            </a:endParaRPr>
+          </a:p>
+        </p:txBody>
+      </p:sp>
+      <p:sp>
+        <p:nvSpPr>
+          <p:cNvPr id="59" name="Line 26"/>
+          <p:cNvSpPr/>
+          <p:nvPr/>
+        </p:nvSpPr>
+        <p:spPr>
+          <a:xfrm flipV="1">
+            <a:off x="2759400" y="4978800"/>
+            <a:ext cx="1136520" cy="493200"/>
+          </a:xfrm>
+          <a:prstGeom prst="line">
+            <a:avLst/>
+          </a:prstGeom>
+          <a:ln>
+            <a:solidFill>
+              <a:srgbClr val="000000"/>
+            </a:solidFill>
+            <a:tailEnd len="med" type="triangle" w="med"/>
+          </a:ln>
+        </p:spPr>
+        <p:style>
+          <a:lnRef idx="0"/>
+          <a:fillRef idx="0"/>
+          <a:effectRef idx="0"/>
+          <a:fontRef idx="minor"/>
+        </p:style>
+      </p:sp>
+      <p:sp>
+        <p:nvSpPr>
+          <p:cNvPr id="60" name="Line 27"/>
+          <p:cNvSpPr/>
+          <p:nvPr/>
+        </p:nvSpPr>
+        <p:spPr>
+          <a:xfrm>
+            <a:off x="2759400" y="5472000"/>
+            <a:ext cx="4722120" cy="0"/>
+          </a:xfrm>
+          <a:prstGeom prst="line">
+            <a:avLst/>
+          </a:prstGeom>
+          <a:ln>
+            <a:solidFill>
+              <a:srgbClr val="000000"/>
+            </a:solidFill>
+            <a:tailEnd len="med" type="triangle" w="med"/>
+          </a:ln>
+        </p:spPr>
+        <p:style>
+          <a:lnRef idx="0"/>
+          <a:fillRef idx="0"/>
+          <a:effectRef idx="0"/>
+          <a:fontRef idx="minor"/>
+        </p:style>
+      </p:sp>
+      <p:sp>
+        <p:nvSpPr>
+          <p:cNvPr id="61" name="Line 28"/>
+          <p:cNvSpPr/>
+          <p:nvPr/>
+        </p:nvSpPr>
+        <p:spPr>
+          <a:xfrm flipH="1" flipV="1">
+            <a:off x="7475040" y="5310360"/>
+            <a:ext cx="6480" cy="161640"/>
+          </a:xfrm>
+          <a:prstGeom prst="line">
+            <a:avLst/>
+          </a:prstGeom>
+          <a:ln>
+            <a:solidFill>
+              <a:srgbClr val="000000"/>
+            </a:solidFill>
+            <a:tailEnd len="med" type="triangle" w="med"/>
+          </a:ln>
+        </p:spPr>
+        <p:style>
+          <a:lnRef idx="0"/>
+          <a:fillRef idx="0"/>
+          <a:effectRef idx="0"/>
+          <a:fontRef idx="minor"/>
+        </p:style>
       </p:sp>
     </p:spTree>
   </p:cSld>

</xml_diff>